<commit_message>
new scores for Sipper;  Changed ChromToleranceInPPM To ChromGenTolerance and added new ChromToleranceUnit, so I can support other ways to state chrom tolerance
Former-commit-id: 84fcfb48712c2b2fa4702974a08b72b344f26d73
Former-commit-id: b0ef02cf8208c72dd4c1c7b22aa6f68f7c9f504c
</commit_message>
<xml_diff>
--- a/Documents/IQ software instructions.pptx
+++ b/Documents/IQ software instructions.pptx
@@ -5,8 +5,12 @@
     <p:sldMasterId id="2147483648" r:id="rId1"/>
   </p:sldMasterIdLst>
   <p:sldIdLst>
-    <p:sldId id="256" r:id="rId2"/>
-    <p:sldId id="257" r:id="rId3"/>
+    <p:sldId id="258" r:id="rId2"/>
+    <p:sldId id="256" r:id="rId3"/>
+    <p:sldId id="257" r:id="rId4"/>
+    <p:sldId id="259" r:id="rId5"/>
+    <p:sldId id="261" r:id="rId6"/>
+    <p:sldId id="260" r:id="rId7"/>
   </p:sldIdLst>
   <p:sldSz cx="9144000" cy="6858000" type="screen4x3"/>
   <p:notesSz cx="6858000" cy="9144000"/>
@@ -289,7 +293,7 @@
           <a:p>
             <a:fld id="{8686B8CE-46F7-4AF5-90E9-745D2CAF5202}" type="datetimeFigureOut">
               <a:rPr lang="en-US" smtClean="0"/>
-              <a:t>12/20/2012</a:t>
+              <a:t>2/4/2013</a:t>
             </a:fld>
             <a:endParaRPr lang="en-US"/>
           </a:p>
@@ -459,7 +463,7 @@
           <a:p>
             <a:fld id="{8686B8CE-46F7-4AF5-90E9-745D2CAF5202}" type="datetimeFigureOut">
               <a:rPr lang="en-US" smtClean="0"/>
-              <a:t>12/20/2012</a:t>
+              <a:t>2/4/2013</a:t>
             </a:fld>
             <a:endParaRPr lang="en-US"/>
           </a:p>
@@ -639,7 +643,7 @@
           <a:p>
             <a:fld id="{8686B8CE-46F7-4AF5-90E9-745D2CAF5202}" type="datetimeFigureOut">
               <a:rPr lang="en-US" smtClean="0"/>
-              <a:t>12/20/2012</a:t>
+              <a:t>2/4/2013</a:t>
             </a:fld>
             <a:endParaRPr lang="en-US"/>
           </a:p>
@@ -809,7 +813,7 @@
           <a:p>
             <a:fld id="{8686B8CE-46F7-4AF5-90E9-745D2CAF5202}" type="datetimeFigureOut">
               <a:rPr lang="en-US" smtClean="0"/>
-              <a:t>12/20/2012</a:t>
+              <a:t>2/4/2013</a:t>
             </a:fld>
             <a:endParaRPr lang="en-US"/>
           </a:p>
@@ -1055,7 +1059,7 @@
           <a:p>
             <a:fld id="{8686B8CE-46F7-4AF5-90E9-745D2CAF5202}" type="datetimeFigureOut">
               <a:rPr lang="en-US" smtClean="0"/>
-              <a:t>12/20/2012</a:t>
+              <a:t>2/4/2013</a:t>
             </a:fld>
             <a:endParaRPr lang="en-US"/>
           </a:p>
@@ -1343,7 +1347,7 @@
           <a:p>
             <a:fld id="{8686B8CE-46F7-4AF5-90E9-745D2CAF5202}" type="datetimeFigureOut">
               <a:rPr lang="en-US" smtClean="0"/>
-              <a:t>12/20/2012</a:t>
+              <a:t>2/4/2013</a:t>
             </a:fld>
             <a:endParaRPr lang="en-US"/>
           </a:p>
@@ -1765,7 +1769,7 @@
           <a:p>
             <a:fld id="{8686B8CE-46F7-4AF5-90E9-745D2CAF5202}" type="datetimeFigureOut">
               <a:rPr lang="en-US" smtClean="0"/>
-              <a:t>12/20/2012</a:t>
+              <a:t>2/4/2013</a:t>
             </a:fld>
             <a:endParaRPr lang="en-US"/>
           </a:p>
@@ -1883,7 +1887,7 @@
           <a:p>
             <a:fld id="{8686B8CE-46F7-4AF5-90E9-745D2CAF5202}" type="datetimeFigureOut">
               <a:rPr lang="en-US" smtClean="0"/>
-              <a:t>12/20/2012</a:t>
+              <a:t>2/4/2013</a:t>
             </a:fld>
             <a:endParaRPr lang="en-US"/>
           </a:p>
@@ -1978,7 +1982,7 @@
           <a:p>
             <a:fld id="{8686B8CE-46F7-4AF5-90E9-745D2CAF5202}" type="datetimeFigureOut">
               <a:rPr lang="en-US" smtClean="0"/>
-              <a:t>12/20/2012</a:t>
+              <a:t>2/4/2013</a:t>
             </a:fld>
             <a:endParaRPr lang="en-US"/>
           </a:p>
@@ -2255,7 +2259,7 @@
           <a:p>
             <a:fld id="{8686B8CE-46F7-4AF5-90E9-745D2CAF5202}" type="datetimeFigureOut">
               <a:rPr lang="en-US" smtClean="0"/>
-              <a:t>12/20/2012</a:t>
+              <a:t>2/4/2013</a:t>
             </a:fld>
             <a:endParaRPr lang="en-US"/>
           </a:p>
@@ -2508,7 +2512,7 @@
           <a:p>
             <a:fld id="{8686B8CE-46F7-4AF5-90E9-745D2CAF5202}" type="datetimeFigureOut">
               <a:rPr lang="en-US" smtClean="0"/>
-              <a:t>12/20/2012</a:t>
+              <a:t>2/4/2013</a:t>
             </a:fld>
             <a:endParaRPr lang="en-US"/>
           </a:p>
@@ -2721,7 +2725,7 @@
           <a:p>
             <a:fld id="{8686B8CE-46F7-4AF5-90E9-745D2CAF5202}" type="datetimeFigureOut">
               <a:rPr lang="en-US" smtClean="0"/>
-              <a:t>12/20/2012</a:t>
+              <a:t>2/4/2013</a:t>
             </a:fld>
             <a:endParaRPr lang="en-US"/>
           </a:p>
@@ -3098,7 +3102,7 @@
       </p:grpSpPr>
       <p:pic>
         <p:nvPicPr>
-          <p:cNvPr id="1026" name="Picture 2"/>
+          <p:cNvPr id="2" name="Picture 2"/>
           <p:cNvPicPr>
             <a:picLocks noChangeAspect="1" noChangeArrowheads="1"/>
           </p:cNvPicPr>
@@ -3119,8 +3123,8 @@
         </p:blipFill>
         <p:spPr bwMode="auto">
           <a:xfrm>
-            <a:off x="990600" y="1752600"/>
-            <a:ext cx="5015215" cy="3167062"/>
+            <a:off x="838200" y="3886200"/>
+            <a:ext cx="3620005" cy="2286000"/>
           </a:xfrm>
           <a:prstGeom prst="rect">
             <a:avLst/>
@@ -3162,14 +3166,14 @@
       </p:pic>
       <p:sp>
         <p:nvSpPr>
-          <p:cNvPr id="4" name="TextBox 3"/>
+          <p:cNvPr id="3" name="TextBox 2"/>
           <p:cNvSpPr txBox="1"/>
           <p:nvPr/>
         </p:nvSpPr>
         <p:spPr>
           <a:xfrm>
-            <a:off x="6629400" y="2057400"/>
-            <a:ext cx="2286000" cy="738664"/>
+            <a:off x="838200" y="533400"/>
+            <a:ext cx="8274253" cy="2585323"/>
           </a:xfrm>
           <a:prstGeom prst="rect">
             <a:avLst/>
@@ -3183,58 +3187,74 @@
           <a:lstStyle/>
           <a:p>
             <a:r>
-              <a:rPr lang="en-US" sz="1400" smtClean="0"/>
-              <a:t>Select dataset (click the folder or enter the path manually)</a:t>
-            </a:r>
-            <a:endParaRPr lang="en-US" sz="1400"/>
-          </a:p>
-        </p:txBody>
-      </p:sp>
-      <p:cxnSp>
-        <p:nvCxnSpPr>
-          <p:cNvPr id="6" name="Straight Arrow Connector 5"/>
-          <p:cNvCxnSpPr>
-            <a:stCxn id="4" idx="1"/>
-          </p:cNvCxnSpPr>
-          <p:nvPr/>
-        </p:nvCxnSpPr>
-        <p:spPr>
-          <a:xfrm flipH="1">
-            <a:off x="5715000" y="2426732"/>
-            <a:ext cx="914400" cy="92333"/>
-          </a:xfrm>
-          <a:prstGeom prst="straightConnector1">
-            <a:avLst/>
-          </a:prstGeom>
-          <a:ln>
-            <a:tailEnd type="arrow"/>
-          </a:ln>
-        </p:spPr>
-        <p:style>
-          <a:lnRef idx="2">
-            <a:schemeClr val="dk1"/>
-          </a:lnRef>
-          <a:fillRef idx="0">
-            <a:schemeClr val="dk1"/>
-          </a:fillRef>
-          <a:effectRef idx="1">
-            <a:schemeClr val="dk1"/>
-          </a:effectRef>
-          <a:fontRef idx="minor">
-            <a:schemeClr val="tx1"/>
-          </a:fontRef>
-        </p:style>
-      </p:cxnSp>
-      <p:sp>
-        <p:nvSpPr>
-          <p:cNvPr id="8" name="TextBox 7"/>
+              <a:rPr lang="en-US" u="sng" smtClean="0"/>
+              <a:t>Two ways to run IQ on your data</a:t>
+            </a:r>
+            <a:r>
+              <a:rPr lang="en-US" smtClean="0"/>
+              <a:t>:</a:t>
+            </a:r>
+          </a:p>
+          <a:p>
+            <a:pPr marL="342900" indent="-342900">
+              <a:buAutoNum type="arabicParenR"/>
+            </a:pPr>
+            <a:r>
+              <a:rPr lang="en-US" smtClean="0"/>
+              <a:t>Using the ‘IQ Autoprocessor’ program.   This is a simple graphical user interface for running IQ. It doesn’t have all the options that the Console version has. </a:t>
+            </a:r>
+          </a:p>
+          <a:p>
+            <a:pPr marL="342900" indent="-342900">
+              <a:buAutoNum type="arabicParenR"/>
+            </a:pPr>
+            <a:r>
+              <a:rPr lang="en-US" smtClean="0"/>
+              <a:t>Using the IQConsole.exe or IQConsoleManager.exe.  These are console-based programs for running IQ.  These are not quite as ‘friendly’ as the ‘IQ Autoprocessor’ but you can do more with them, such as </a:t>
+            </a:r>
+          </a:p>
+          <a:p>
+            <a:pPr marL="800100" lvl="1" indent="-342900">
+              <a:buFont typeface="Arial" pitchFamily="34" charset="0"/>
+              <a:buChar char="•"/>
+            </a:pPr>
+            <a:r>
+              <a:rPr lang="en-US" smtClean="0"/>
+              <a:t>Batch processing</a:t>
+            </a:r>
+          </a:p>
+          <a:p>
+            <a:pPr marL="800100" lvl="1" indent="-342900">
+              <a:buFont typeface="Arial" pitchFamily="34" charset="0"/>
+              <a:buChar char="•"/>
+            </a:pPr>
+            <a:r>
+              <a:rPr lang="en-US" smtClean="0"/>
+              <a:t>Specifying locations of results and log files. </a:t>
+            </a:r>
+          </a:p>
+          <a:p>
+            <a:pPr marL="800100" lvl="1" indent="-342900">
+              <a:buFont typeface="Arial" pitchFamily="34" charset="0"/>
+              <a:buChar char="•"/>
+            </a:pPr>
+            <a:r>
+              <a:rPr lang="en-US" smtClean="0"/>
+              <a:t>Control over LC-alignment of the datasets</a:t>
+            </a:r>
+          </a:p>
+        </p:txBody>
+      </p:sp>
+      <p:sp>
+        <p:nvSpPr>
+          <p:cNvPr id="4" name="TextBox 3"/>
           <p:cNvSpPr txBox="1"/>
           <p:nvPr/>
         </p:nvSpPr>
         <p:spPr>
           <a:xfrm>
-            <a:off x="6629400" y="2829580"/>
-            <a:ext cx="2514600" cy="523220"/>
+            <a:off x="5867400" y="3657600"/>
+            <a:ext cx="2667000" cy="369332"/>
           </a:xfrm>
           <a:prstGeom prst="rect">
             <a:avLst/>
@@ -3248,23 +3268,67 @@
           <a:lstStyle/>
           <a:p>
             <a:r>
-              <a:rPr lang="en-US" sz="1400" smtClean="0"/>
-              <a:t>Select workflow parameter file. This is an IQ .xml parameter file</a:t>
-            </a:r>
-            <a:endParaRPr lang="en-US" sz="1400"/>
-          </a:p>
-        </p:txBody>
-      </p:sp>
-      <p:sp>
-        <p:nvSpPr>
-          <p:cNvPr id="9" name="TextBox 8"/>
+              <a:rPr lang="en-US" smtClean="0"/>
+              <a:t>IQConsole.exe</a:t>
+            </a:r>
+            <a:endParaRPr lang="en-US"/>
+          </a:p>
+        </p:txBody>
+      </p:sp>
+      <p:sp>
+        <p:nvSpPr>
+          <p:cNvPr id="6" name="Rectangle 5"/>
+          <p:cNvSpPr/>
+          <p:nvPr/>
+        </p:nvSpPr>
+        <p:spPr>
+          <a:xfrm>
+            <a:off x="4800600" y="4114800"/>
+            <a:ext cx="3886200" cy="600164"/>
+          </a:xfrm>
+          <a:prstGeom prst="rect">
+            <a:avLst/>
+          </a:prstGeom>
+          <a:solidFill>
+            <a:schemeClr val="tx1"/>
+          </a:solidFill>
+        </p:spPr>
+        <p:txBody>
+          <a:bodyPr wrap="square">
+            <a:spAutoFit/>
+          </a:bodyPr>
+          <a:lstStyle/>
+          <a:p>
+            <a:r>
+              <a:rPr lang="en-US" sz="1100">
+                <a:solidFill>
+                  <a:schemeClr val="bg1"/>
+                </a:solidFill>
+                <a:latin typeface="Courier New" pitchFamily="49" charset="0"/>
+                <a:cs typeface="Courier New" pitchFamily="49" charset="0"/>
+              </a:rPr>
+              <a:t>IQConsole "D:\Data\Orbitrap\QC_Shew_08_04-pt1-3_15Apr09_Sphinx_09-02-16.RAW " "D:\Data\Orbitrap\IQExecutorParameters.xml" </a:t>
+            </a:r>
+            <a:endParaRPr lang="en-US" sz="1100">
+              <a:solidFill>
+                <a:schemeClr val="bg1"/>
+              </a:solidFill>
+              <a:latin typeface="Courier New" pitchFamily="49" charset="0"/>
+              <a:cs typeface="Courier New" pitchFamily="49" charset="0"/>
+            </a:endParaRPr>
+          </a:p>
+        </p:txBody>
+      </p:sp>
+      <p:sp>
+        <p:nvSpPr>
+          <p:cNvPr id="8" name="TextBox 7"/>
           <p:cNvSpPr txBox="1"/>
           <p:nvPr/>
         </p:nvSpPr>
         <p:spPr>
           <a:xfrm>
-            <a:off x="6629400" y="3505200"/>
-            <a:ext cx="2514600" cy="738664"/>
+            <a:off x="1371600" y="3545541"/>
+            <a:ext cx="2667000" cy="369332"/>
           </a:xfrm>
           <a:prstGeom prst="rect">
             <a:avLst/>
@@ -3278,150 +3342,8 @@
           <a:lstStyle/>
           <a:p>
             <a:r>
-              <a:rPr lang="en-US" sz="1400" smtClean="0"/>
-              <a:t>Select the targets .txt file. IQ will load these targets and iterate over them.</a:t>
-            </a:r>
-            <a:endParaRPr lang="en-US" sz="1400"/>
-          </a:p>
-        </p:txBody>
-      </p:sp>
-      <p:cxnSp>
-        <p:nvCxnSpPr>
-          <p:cNvPr id="10" name="Straight Arrow Connector 9"/>
-          <p:cNvCxnSpPr>
-            <a:stCxn id="8" idx="1"/>
-          </p:cNvCxnSpPr>
-          <p:nvPr/>
-        </p:nvCxnSpPr>
-        <p:spPr>
-          <a:xfrm flipH="1">
-            <a:off x="5666282" y="3091190"/>
-            <a:ext cx="963118" cy="0"/>
-          </a:xfrm>
-          <a:prstGeom prst="straightConnector1">
-            <a:avLst/>
-          </a:prstGeom>
-          <a:ln>
-            <a:tailEnd type="arrow"/>
-          </a:ln>
-        </p:spPr>
-        <p:style>
-          <a:lnRef idx="2">
-            <a:schemeClr val="dk1"/>
-          </a:lnRef>
-          <a:fillRef idx="0">
-            <a:schemeClr val="dk1"/>
-          </a:fillRef>
-          <a:effectRef idx="1">
-            <a:schemeClr val="dk1"/>
-          </a:effectRef>
-          <a:fontRef idx="minor">
-            <a:schemeClr val="tx1"/>
-          </a:fontRef>
-        </p:style>
-      </p:cxnSp>
-      <p:cxnSp>
-        <p:nvCxnSpPr>
-          <p:cNvPr id="12" name="Straight Arrow Connector 11"/>
-          <p:cNvCxnSpPr>
-            <a:stCxn id="9" idx="1"/>
-          </p:cNvCxnSpPr>
-          <p:nvPr/>
-        </p:nvCxnSpPr>
-        <p:spPr>
-          <a:xfrm flipH="1" flipV="1">
-            <a:off x="5715000" y="3505200"/>
-            <a:ext cx="914400" cy="369332"/>
-          </a:xfrm>
-          <a:prstGeom prst="straightConnector1">
-            <a:avLst/>
-          </a:prstGeom>
-          <a:ln>
-            <a:tailEnd type="arrow"/>
-          </a:ln>
-        </p:spPr>
-        <p:style>
-          <a:lnRef idx="2">
-            <a:schemeClr val="dk1"/>
-          </a:lnRef>
-          <a:fillRef idx="0">
-            <a:schemeClr val="dk1"/>
-          </a:fillRef>
-          <a:effectRef idx="1">
-            <a:schemeClr val="dk1"/>
-          </a:effectRef>
-          <a:fontRef idx="minor">
-            <a:schemeClr val="tx1"/>
-          </a:fontRef>
-        </p:style>
-      </p:cxnSp>
-      <p:sp>
-        <p:nvSpPr>
-          <p:cNvPr id="14" name="TextBox 13"/>
-          <p:cNvSpPr txBox="1"/>
-          <p:nvPr/>
-        </p:nvSpPr>
-        <p:spPr>
-          <a:xfrm>
-            <a:off x="838200" y="609600"/>
-            <a:ext cx="3810000" cy="461665"/>
-          </a:xfrm>
-          <a:prstGeom prst="rect">
-            <a:avLst/>
-          </a:prstGeom>
-          <a:noFill/>
-        </p:spPr>
-        <p:txBody>
-          <a:bodyPr wrap="square" rtlCol="0">
-            <a:spAutoFit/>
-          </a:bodyPr>
-          <a:lstStyle/>
-          <a:p>
-            <a:r>
-              <a:rPr lang="en-US" sz="2400" b="1" smtClean="0"/>
-              <a:t>IQ Autoprocessor - Inputs</a:t>
-            </a:r>
-            <a:endParaRPr lang="en-US" sz="2400" b="1"/>
-          </a:p>
-        </p:txBody>
-      </p:sp>
-      <p:sp>
-        <p:nvSpPr>
-          <p:cNvPr id="15" name="TextBox 14"/>
-          <p:cNvSpPr txBox="1"/>
-          <p:nvPr/>
-        </p:nvSpPr>
-        <p:spPr>
-          <a:xfrm>
-            <a:off x="990601" y="5562600"/>
-            <a:ext cx="7391400" cy="923330"/>
-          </a:xfrm>
-          <a:prstGeom prst="rect">
-            <a:avLst/>
-          </a:prstGeom>
-          <a:noFill/>
-        </p:spPr>
-        <p:txBody>
-          <a:bodyPr wrap="square" rtlCol="0">
-            <a:spAutoFit/>
-          </a:bodyPr>
-          <a:lstStyle/>
-          <a:p>
-            <a:r>
-              <a:rPr lang="en-US" smtClean="0"/>
-              <a:t>For PNNL users:   see demo files here:</a:t>
-            </a:r>
-          </a:p>
-          <a:p>
-            <a:r>
-              <a:rPr lang="en-US" smtClean="0">
-                <a:hlinkClick r:id="rId3" action="ppaction://hlinkfile"/>
-              </a:rPr>
-              <a:t>\\protoapps\UserData\Slysz\Standard_Testing\Targeted_FeatureFinding\O16O18_standard_testing\IQDemo</a:t>
-            </a:r>
-            <a:r>
-              <a:rPr lang="en-US" smtClean="0"/>
-              <a:t> </a:t>
+              <a:rPr lang="en-US" smtClean="0"/>
+              <a:t>IQ Autoprocesor</a:t>
             </a:r>
             <a:endParaRPr lang="en-US"/>
           </a:p>
@@ -3430,7 +3352,7 @@
     </p:spTree>
     <p:extLst>
       <p:ext uri="{BB962C8B-B14F-4D97-AF65-F5344CB8AC3E}">
-        <p14:creationId xmlns:p14="http://schemas.microsoft.com/office/powerpoint/2010/main" val="4039784401"/>
+        <p14:creationId xmlns:p14="http://schemas.microsoft.com/office/powerpoint/2010/main" val="2382211025"/>
       </p:ext>
     </p:extLst>
   </p:cSld>
@@ -3457,6 +3379,373 @@
           <a:chExt cx="0" cy="0"/>
         </a:xfrm>
       </p:grpSpPr>
+      <p:pic>
+        <p:nvPicPr>
+          <p:cNvPr id="1026" name="Picture 2"/>
+          <p:cNvPicPr>
+            <a:picLocks noChangeAspect="1" noChangeArrowheads="1"/>
+          </p:cNvPicPr>
+          <p:nvPr/>
+        </p:nvPicPr>
+        <p:blipFill>
+          <a:blip r:embed="rId2">
+            <a:extLst>
+              <a:ext uri="{28A0092B-C50C-407E-A947-70E740481C1C}">
+                <a14:useLocalDpi xmlns:a14="http://schemas.microsoft.com/office/drawing/2010/main" val="0"/>
+              </a:ext>
+            </a:extLst>
+          </a:blip>
+          <a:srcRect/>
+          <a:stretch>
+            <a:fillRect/>
+          </a:stretch>
+        </p:blipFill>
+        <p:spPr bwMode="auto">
+          <a:xfrm>
+            <a:off x="990600" y="1362670"/>
+            <a:ext cx="5015215" cy="3167062"/>
+          </a:xfrm>
+          <a:prstGeom prst="rect">
+            <a:avLst/>
+          </a:prstGeom>
+          <a:noFill/>
+          <a:ln>
+            <a:noFill/>
+          </a:ln>
+          <a:effectLst/>
+          <a:extLst>
+            <a:ext uri="{909E8E84-426E-40DD-AFC4-6F175D3DCCD1}">
+              <a14:hiddenFill xmlns:a14="http://schemas.microsoft.com/office/drawing/2010/main">
+                <a:solidFill>
+                  <a:schemeClr val="accent1"/>
+                </a:solidFill>
+              </a14:hiddenFill>
+            </a:ext>
+            <a:ext uri="{91240B29-F687-4F45-9708-019B960494DF}">
+              <a14:hiddenLine xmlns:a14="http://schemas.microsoft.com/office/drawing/2010/main" w="9525">
+                <a:solidFill>
+                  <a:schemeClr val="tx1"/>
+                </a:solidFill>
+                <a:miter lim="800000"/>
+                <a:headEnd/>
+                <a:tailEnd/>
+              </a14:hiddenLine>
+            </a:ext>
+            <a:ext uri="{AF507438-7753-43E0-B8FC-AC1667EBCBE1}">
+              <a14:hiddenEffects xmlns:a14="http://schemas.microsoft.com/office/drawing/2010/main">
+                <a:effectLst>
+                  <a:outerShdw dist="35921" dir="2700000" algn="ctr" rotWithShape="0">
+                    <a:schemeClr val="bg2"/>
+                  </a:outerShdw>
+                </a:effectLst>
+              </a14:hiddenEffects>
+            </a:ext>
+          </a:extLst>
+        </p:spPr>
+      </p:pic>
+      <p:sp>
+        <p:nvSpPr>
+          <p:cNvPr id="4" name="TextBox 3"/>
+          <p:cNvSpPr txBox="1"/>
+          <p:nvPr/>
+        </p:nvSpPr>
+        <p:spPr>
+          <a:xfrm>
+            <a:off x="6629400" y="1667470"/>
+            <a:ext cx="2286000" cy="738664"/>
+          </a:xfrm>
+          <a:prstGeom prst="rect">
+            <a:avLst/>
+          </a:prstGeom>
+          <a:noFill/>
+        </p:spPr>
+        <p:txBody>
+          <a:bodyPr wrap="square" rtlCol="0">
+            <a:spAutoFit/>
+          </a:bodyPr>
+          <a:lstStyle/>
+          <a:p>
+            <a:r>
+              <a:rPr lang="en-US" sz="1400" smtClean="0"/>
+              <a:t>Select dataset (click the folder or enter the path manually)</a:t>
+            </a:r>
+            <a:endParaRPr lang="en-US" sz="1400"/>
+          </a:p>
+        </p:txBody>
+      </p:sp>
+      <p:cxnSp>
+        <p:nvCxnSpPr>
+          <p:cNvPr id="6" name="Straight Arrow Connector 5"/>
+          <p:cNvCxnSpPr>
+            <a:stCxn id="4" idx="1"/>
+          </p:cNvCxnSpPr>
+          <p:nvPr/>
+        </p:nvCxnSpPr>
+        <p:spPr>
+          <a:xfrm flipH="1">
+            <a:off x="5715000" y="2036802"/>
+            <a:ext cx="914400" cy="92333"/>
+          </a:xfrm>
+          <a:prstGeom prst="straightConnector1">
+            <a:avLst/>
+          </a:prstGeom>
+          <a:ln>
+            <a:tailEnd type="arrow"/>
+          </a:ln>
+        </p:spPr>
+        <p:style>
+          <a:lnRef idx="2">
+            <a:schemeClr val="dk1"/>
+          </a:lnRef>
+          <a:fillRef idx="0">
+            <a:schemeClr val="dk1"/>
+          </a:fillRef>
+          <a:effectRef idx="1">
+            <a:schemeClr val="dk1"/>
+          </a:effectRef>
+          <a:fontRef idx="minor">
+            <a:schemeClr val="tx1"/>
+          </a:fontRef>
+        </p:style>
+      </p:cxnSp>
+      <p:sp>
+        <p:nvSpPr>
+          <p:cNvPr id="8" name="TextBox 7"/>
+          <p:cNvSpPr txBox="1"/>
+          <p:nvPr/>
+        </p:nvSpPr>
+        <p:spPr>
+          <a:xfrm>
+            <a:off x="6629400" y="2439650"/>
+            <a:ext cx="2514600" cy="523220"/>
+          </a:xfrm>
+          <a:prstGeom prst="rect">
+            <a:avLst/>
+          </a:prstGeom>
+          <a:noFill/>
+        </p:spPr>
+        <p:txBody>
+          <a:bodyPr wrap="square" rtlCol="0">
+            <a:spAutoFit/>
+          </a:bodyPr>
+          <a:lstStyle/>
+          <a:p>
+            <a:r>
+              <a:rPr lang="en-US" sz="1400" smtClean="0"/>
+              <a:t>Select workflow parameter file. This is an IQ .xml parameter file</a:t>
+            </a:r>
+            <a:endParaRPr lang="en-US" sz="1400"/>
+          </a:p>
+        </p:txBody>
+      </p:sp>
+      <p:sp>
+        <p:nvSpPr>
+          <p:cNvPr id="9" name="TextBox 8"/>
+          <p:cNvSpPr txBox="1"/>
+          <p:nvPr/>
+        </p:nvSpPr>
+        <p:spPr>
+          <a:xfrm>
+            <a:off x="6629400" y="3115270"/>
+            <a:ext cx="2514600" cy="738664"/>
+          </a:xfrm>
+          <a:prstGeom prst="rect">
+            <a:avLst/>
+          </a:prstGeom>
+          <a:noFill/>
+        </p:spPr>
+        <p:txBody>
+          <a:bodyPr wrap="square" rtlCol="0">
+            <a:spAutoFit/>
+          </a:bodyPr>
+          <a:lstStyle/>
+          <a:p>
+            <a:r>
+              <a:rPr lang="en-US" sz="1400" smtClean="0"/>
+              <a:t>Select the targets .txt file. IQ will load these targets and iterate over them.</a:t>
+            </a:r>
+            <a:endParaRPr lang="en-US" sz="1400"/>
+          </a:p>
+        </p:txBody>
+      </p:sp>
+      <p:cxnSp>
+        <p:nvCxnSpPr>
+          <p:cNvPr id="10" name="Straight Arrow Connector 9"/>
+          <p:cNvCxnSpPr>
+            <a:stCxn id="8" idx="1"/>
+          </p:cNvCxnSpPr>
+          <p:nvPr/>
+        </p:nvCxnSpPr>
+        <p:spPr>
+          <a:xfrm flipH="1">
+            <a:off x="5666282" y="2701260"/>
+            <a:ext cx="963118" cy="0"/>
+          </a:xfrm>
+          <a:prstGeom prst="straightConnector1">
+            <a:avLst/>
+          </a:prstGeom>
+          <a:ln>
+            <a:tailEnd type="arrow"/>
+          </a:ln>
+        </p:spPr>
+        <p:style>
+          <a:lnRef idx="2">
+            <a:schemeClr val="dk1"/>
+          </a:lnRef>
+          <a:fillRef idx="0">
+            <a:schemeClr val="dk1"/>
+          </a:fillRef>
+          <a:effectRef idx="1">
+            <a:schemeClr val="dk1"/>
+          </a:effectRef>
+          <a:fontRef idx="minor">
+            <a:schemeClr val="tx1"/>
+          </a:fontRef>
+        </p:style>
+      </p:cxnSp>
+      <p:cxnSp>
+        <p:nvCxnSpPr>
+          <p:cNvPr id="12" name="Straight Arrow Connector 11"/>
+          <p:cNvCxnSpPr>
+            <a:stCxn id="9" idx="1"/>
+          </p:cNvCxnSpPr>
+          <p:nvPr/>
+        </p:nvCxnSpPr>
+        <p:spPr>
+          <a:xfrm flipH="1" flipV="1">
+            <a:off x="5715000" y="3115270"/>
+            <a:ext cx="914400" cy="369332"/>
+          </a:xfrm>
+          <a:prstGeom prst="straightConnector1">
+            <a:avLst/>
+          </a:prstGeom>
+          <a:ln>
+            <a:tailEnd type="arrow"/>
+          </a:ln>
+        </p:spPr>
+        <p:style>
+          <a:lnRef idx="2">
+            <a:schemeClr val="dk1"/>
+          </a:lnRef>
+          <a:fillRef idx="0">
+            <a:schemeClr val="dk1"/>
+          </a:fillRef>
+          <a:effectRef idx="1">
+            <a:schemeClr val="dk1"/>
+          </a:effectRef>
+          <a:fontRef idx="minor">
+            <a:schemeClr val="tx1"/>
+          </a:fontRef>
+        </p:style>
+      </p:cxnSp>
+      <p:sp>
+        <p:nvSpPr>
+          <p:cNvPr id="14" name="TextBox 13"/>
+          <p:cNvSpPr txBox="1"/>
+          <p:nvPr/>
+        </p:nvSpPr>
+        <p:spPr>
+          <a:xfrm>
+            <a:off x="838200" y="609600"/>
+            <a:ext cx="3810000" cy="461665"/>
+          </a:xfrm>
+          <a:prstGeom prst="rect">
+            <a:avLst/>
+          </a:prstGeom>
+          <a:noFill/>
+        </p:spPr>
+        <p:txBody>
+          <a:bodyPr wrap="square" rtlCol="0">
+            <a:spAutoFit/>
+          </a:bodyPr>
+          <a:lstStyle/>
+          <a:p>
+            <a:r>
+              <a:rPr lang="en-US" sz="2400" b="1" smtClean="0"/>
+              <a:t>IQ Autoprocessor - Inputs</a:t>
+            </a:r>
+            <a:endParaRPr lang="en-US" sz="2400" b="1"/>
+          </a:p>
+        </p:txBody>
+      </p:sp>
+      <p:sp>
+        <p:nvSpPr>
+          <p:cNvPr id="15" name="TextBox 14"/>
+          <p:cNvSpPr txBox="1"/>
+          <p:nvPr/>
+        </p:nvSpPr>
+        <p:spPr>
+          <a:xfrm>
+            <a:off x="990601" y="5172670"/>
+            <a:ext cx="7391400" cy="646331"/>
+          </a:xfrm>
+          <a:prstGeom prst="rect">
+            <a:avLst/>
+          </a:prstGeom>
+          <a:noFill/>
+        </p:spPr>
+        <p:txBody>
+          <a:bodyPr wrap="square" rtlCol="0">
+            <a:spAutoFit/>
+          </a:bodyPr>
+          <a:lstStyle/>
+          <a:p>
+            <a:r>
+              <a:rPr lang="en-US" smtClean="0"/>
+              <a:t>For PNNL users:   see demo files here:</a:t>
+            </a:r>
+          </a:p>
+          <a:p>
+            <a:r>
+              <a:rPr lang="en-US">
+                <a:hlinkClick r:id="rId3" action="ppaction://hlinkfile"/>
+              </a:rPr>
+              <a:t>\\</a:t>
+            </a:r>
+            <a:r>
+              <a:rPr lang="en-US" smtClean="0">
+                <a:hlinkClick r:id="rId3" action="ppaction://hlinkfile"/>
+              </a:rPr>
+              <a:t>protoapps\UserData\Slysz\IQ_Demo</a:t>
+            </a:r>
+            <a:r>
+              <a:rPr lang="en-US" smtClean="0"/>
+              <a:t> </a:t>
+            </a:r>
+            <a:endParaRPr lang="en-US"/>
+          </a:p>
+        </p:txBody>
+      </p:sp>
+    </p:spTree>
+    <p:extLst>
+      <p:ext uri="{BB962C8B-B14F-4D97-AF65-F5344CB8AC3E}">
+        <p14:creationId xmlns:p14="http://schemas.microsoft.com/office/powerpoint/2010/main" val="4039784401"/>
+      </p:ext>
+    </p:extLst>
+  </p:cSld>
+  <p:clrMapOvr>
+    <a:masterClrMapping/>
+  </p:clrMapOvr>
+</p:sld>
+</file>
+
+<file path=ppt/slides/slide3.xml><?xml version="1.0" encoding="utf-8"?>
+<p:sld xmlns:a="http://schemas.openxmlformats.org/drawingml/2006/main" xmlns:r="http://schemas.openxmlformats.org/officeDocument/2006/relationships" xmlns:p="http://schemas.openxmlformats.org/presentationml/2006/main">
+  <p:cSld>
+    <p:spTree>
+      <p:nvGrpSpPr>
+        <p:cNvPr id="1" name=""/>
+        <p:cNvGrpSpPr/>
+        <p:nvPr/>
+      </p:nvGrpSpPr>
+      <p:grpSpPr>
+        <a:xfrm>
+          <a:off x="0" y="0"/>
+          <a:ext cx="0" cy="0"/>
+          <a:chOff x="0" y="0"/>
+          <a:chExt cx="0" cy="0"/>
+        </a:xfrm>
+      </p:grpSpPr>
       <p:sp>
         <p:nvSpPr>
           <p:cNvPr id="2" name="TextBox 1"/>
@@ -3557,6 +3846,850 @@
     <p:extLst>
       <p:ext uri="{BB962C8B-B14F-4D97-AF65-F5344CB8AC3E}">
         <p14:creationId xmlns:p14="http://schemas.microsoft.com/office/powerpoint/2010/main" val="217797150"/>
+      </p:ext>
+    </p:extLst>
+  </p:cSld>
+  <p:clrMapOvr>
+    <a:masterClrMapping/>
+  </p:clrMapOvr>
+</p:sld>
+</file>
+
+<file path=ppt/slides/slide4.xml><?xml version="1.0" encoding="utf-8"?>
+<p:sld xmlns:a="http://schemas.openxmlformats.org/drawingml/2006/main" xmlns:r="http://schemas.openxmlformats.org/officeDocument/2006/relationships" xmlns:p="http://schemas.openxmlformats.org/presentationml/2006/main">
+  <p:cSld>
+    <p:spTree>
+      <p:nvGrpSpPr>
+        <p:cNvPr id="1" name=""/>
+        <p:cNvGrpSpPr/>
+        <p:nvPr/>
+      </p:nvGrpSpPr>
+      <p:grpSpPr>
+        <a:xfrm>
+          <a:off x="0" y="0"/>
+          <a:ext cx="0" cy="0"/>
+          <a:chOff x="0" y="0"/>
+          <a:chExt cx="0" cy="0"/>
+        </a:xfrm>
+      </p:grpSpPr>
+      <p:sp>
+        <p:nvSpPr>
+          <p:cNvPr id="3" name="TextBox 2"/>
+          <p:cNvSpPr txBox="1"/>
+          <p:nvPr/>
+        </p:nvSpPr>
+        <p:spPr>
+          <a:xfrm>
+            <a:off x="856128" y="972843"/>
+            <a:ext cx="3258671" cy="369332"/>
+          </a:xfrm>
+          <a:prstGeom prst="rect">
+            <a:avLst/>
+          </a:prstGeom>
+          <a:noFill/>
+        </p:spPr>
+        <p:txBody>
+          <a:bodyPr wrap="square" rtlCol="0">
+            <a:spAutoFit/>
+          </a:bodyPr>
+          <a:lstStyle/>
+          <a:p>
+            <a:r>
+              <a:rPr lang="en-US" smtClean="0"/>
+              <a:t>IQConsole.exe</a:t>
+            </a:r>
+            <a:endParaRPr lang="en-US"/>
+          </a:p>
+        </p:txBody>
+      </p:sp>
+      <p:sp>
+        <p:nvSpPr>
+          <p:cNvPr id="4" name="TextBox 3"/>
+          <p:cNvSpPr txBox="1"/>
+          <p:nvPr/>
+        </p:nvSpPr>
+        <p:spPr>
+          <a:xfrm>
+            <a:off x="856129" y="2156936"/>
+            <a:ext cx="7773090" cy="2200602"/>
+          </a:xfrm>
+          <a:prstGeom prst="rect">
+            <a:avLst/>
+          </a:prstGeom>
+          <a:noFill/>
+        </p:spPr>
+        <p:txBody>
+          <a:bodyPr wrap="square" rtlCol="0">
+            <a:spAutoFit/>
+          </a:bodyPr>
+          <a:lstStyle/>
+          <a:p>
+            <a:r>
+              <a:rPr lang="en-US" b="1" u="sng" smtClean="0"/>
+              <a:t>How to use IQConsole.exe:</a:t>
+            </a:r>
+          </a:p>
+          <a:p>
+            <a:r>
+              <a:rPr lang="en-US" smtClean="0"/>
+              <a:t>IQConsole.exe minimally requires two command line arguments:</a:t>
+            </a:r>
+          </a:p>
+          <a:p>
+            <a:pPr marL="285750" indent="-285750">
+              <a:buFont typeface="Arial" pitchFamily="34" charset="0"/>
+              <a:buChar char="•"/>
+            </a:pPr>
+            <a:r>
+              <a:rPr lang="en-US"/>
+              <a:t>Arg1 = dataset file path  </a:t>
+            </a:r>
+            <a:r>
+              <a:rPr lang="en-US" sz="1100"/>
+              <a:t>(e.g   "D</a:t>
+            </a:r>
+            <a:r>
+              <a:rPr lang="en-US" sz="1100"/>
+              <a:t>:\</a:t>
+            </a:r>
+            <a:r>
+              <a:rPr lang="en-US" sz="1100" smtClean="0"/>
+              <a:t>Data\Orbitrap\QC_Shew_08_04-pt1-3_15Apr09_Sphinx_09-02-16.RAW“)</a:t>
+            </a:r>
+          </a:p>
+          <a:p>
+            <a:pPr marL="285750" indent="-285750">
+              <a:buFont typeface="Arial" pitchFamily="34" charset="0"/>
+              <a:buChar char="•"/>
+            </a:pPr>
+            <a:r>
+              <a:rPr lang="en-US"/>
+              <a:t>Arg 2 </a:t>
+            </a:r>
+            <a:r>
+              <a:rPr lang="en-US"/>
+              <a:t>= </a:t>
+            </a:r>
+            <a:r>
+              <a:rPr lang="en-US"/>
+              <a:t>file path for </a:t>
+            </a:r>
+            <a:r>
+              <a:rPr lang="en-US"/>
+              <a:t>IQ </a:t>
+            </a:r>
+            <a:r>
+              <a:rPr lang="en-US" smtClean="0"/>
+              <a:t>executor parameters </a:t>
+            </a:r>
+            <a:r>
+              <a:rPr lang="en-US" sz="1100"/>
+              <a:t>(e.g</a:t>
+            </a:r>
+            <a:r>
+              <a:rPr lang="en-US" sz="1100"/>
+              <a:t>. </a:t>
+            </a:r>
+            <a:r>
+              <a:rPr lang="en-US" sz="1100"/>
+              <a:t>"D:\Data\Orbitrap\IQExecutorParameters.xml")</a:t>
+            </a:r>
+          </a:p>
+          <a:p>
+            <a:pPr marL="742950" lvl="1" indent="-285750">
+              <a:buFont typeface="Arial" pitchFamily="34" charset="0"/>
+              <a:buChar char="•"/>
+            </a:pPr>
+            <a:r>
+              <a:rPr lang="en-US" sz="1100" smtClean="0"/>
+              <a:t>See below for IQ executor parameters information</a:t>
+            </a:r>
+            <a:endParaRPr lang="en-US"/>
+          </a:p>
+          <a:p>
+            <a:endParaRPr lang="en-US" smtClean="0"/>
+          </a:p>
+          <a:p>
+            <a:r>
+              <a:rPr lang="en-US" smtClean="0"/>
+              <a:t>Sample command line (assumes that you are in the same folder as the IQConsole.exe program:</a:t>
+            </a:r>
+            <a:endParaRPr lang="en-US"/>
+          </a:p>
+        </p:txBody>
+      </p:sp>
+      <p:sp>
+        <p:nvSpPr>
+          <p:cNvPr id="5" name="Rectangle 4"/>
+          <p:cNvSpPr/>
+          <p:nvPr/>
+        </p:nvSpPr>
+        <p:spPr>
+          <a:xfrm>
+            <a:off x="990600" y="4355068"/>
+            <a:ext cx="7162800" cy="461665"/>
+          </a:xfrm>
+          <a:prstGeom prst="rect">
+            <a:avLst/>
+          </a:prstGeom>
+          <a:solidFill>
+            <a:schemeClr val="tx1"/>
+          </a:solidFill>
+        </p:spPr>
+        <p:txBody>
+          <a:bodyPr wrap="square">
+            <a:spAutoFit/>
+          </a:bodyPr>
+          <a:lstStyle/>
+          <a:p>
+            <a:r>
+              <a:rPr lang="en-US" sz="1200">
+                <a:solidFill>
+                  <a:schemeClr val="bg1"/>
+                </a:solidFill>
+                <a:latin typeface="Courier New" pitchFamily="49" charset="0"/>
+                <a:cs typeface="Courier New" pitchFamily="49" charset="0"/>
+              </a:rPr>
+              <a:t>IQConsole "D:\Data\Orbitrap\QC_Shew_08_04-pt1-3_15Apr09_Sphinx_09-02-16.RAW " "D:\Data\Orbitrap\IQExecutorParameters.xml" </a:t>
+            </a:r>
+            <a:endParaRPr lang="en-US" sz="1200">
+              <a:solidFill>
+                <a:schemeClr val="bg1"/>
+              </a:solidFill>
+              <a:latin typeface="Courier New" pitchFamily="49" charset="0"/>
+              <a:cs typeface="Courier New" pitchFamily="49" charset="0"/>
+            </a:endParaRPr>
+          </a:p>
+        </p:txBody>
+      </p:sp>
+      <p:sp>
+        <p:nvSpPr>
+          <p:cNvPr id="7" name="TextBox 6"/>
+          <p:cNvSpPr txBox="1"/>
+          <p:nvPr/>
+        </p:nvSpPr>
+        <p:spPr>
+          <a:xfrm>
+            <a:off x="856128" y="4964668"/>
+            <a:ext cx="7773090" cy="369332"/>
+          </a:xfrm>
+          <a:prstGeom prst="rect">
+            <a:avLst/>
+          </a:prstGeom>
+          <a:noFill/>
+        </p:spPr>
+        <p:txBody>
+          <a:bodyPr wrap="square" rtlCol="0">
+            <a:spAutoFit/>
+          </a:bodyPr>
+          <a:lstStyle/>
+          <a:p>
+            <a:r>
+              <a:rPr lang="en-US" smtClean="0"/>
+              <a:t>** note the space characters between each argument.</a:t>
+            </a:r>
+            <a:endParaRPr lang="en-US"/>
+          </a:p>
+        </p:txBody>
+      </p:sp>
+      <p:sp>
+        <p:nvSpPr>
+          <p:cNvPr id="8" name="TextBox 7"/>
+          <p:cNvSpPr txBox="1"/>
+          <p:nvPr/>
+        </p:nvSpPr>
+        <p:spPr>
+          <a:xfrm>
+            <a:off x="883024" y="1342175"/>
+            <a:ext cx="7773090" cy="646331"/>
+          </a:xfrm>
+          <a:prstGeom prst="rect">
+            <a:avLst/>
+          </a:prstGeom>
+          <a:noFill/>
+        </p:spPr>
+        <p:txBody>
+          <a:bodyPr wrap="square" rtlCol="0">
+            <a:spAutoFit/>
+          </a:bodyPr>
+          <a:lstStyle/>
+          <a:p>
+            <a:r>
+              <a:rPr lang="en-US" b="1" u="sng" smtClean="0"/>
+              <a:t>Description:</a:t>
+            </a:r>
+          </a:p>
+          <a:p>
+            <a:r>
+              <a:rPr lang="en-US" smtClean="0"/>
+              <a:t>IQConsole processes a single dataset at a time.</a:t>
+            </a:r>
+          </a:p>
+        </p:txBody>
+      </p:sp>
+    </p:spTree>
+    <p:extLst>
+      <p:ext uri="{BB962C8B-B14F-4D97-AF65-F5344CB8AC3E}">
+        <p14:creationId xmlns:p14="http://schemas.microsoft.com/office/powerpoint/2010/main" val="1997487791"/>
+      </p:ext>
+    </p:extLst>
+  </p:cSld>
+  <p:clrMapOvr>
+    <a:masterClrMapping/>
+  </p:clrMapOvr>
+</p:sld>
+</file>
+
+<file path=ppt/slides/slide5.xml><?xml version="1.0" encoding="utf-8"?>
+<p:sld xmlns:a="http://schemas.openxmlformats.org/drawingml/2006/main" xmlns:r="http://schemas.openxmlformats.org/officeDocument/2006/relationships" xmlns:p="http://schemas.openxmlformats.org/presentationml/2006/main">
+  <p:cSld>
+    <p:spTree>
+      <p:nvGrpSpPr>
+        <p:cNvPr id="1" name=""/>
+        <p:cNvGrpSpPr/>
+        <p:nvPr/>
+      </p:nvGrpSpPr>
+      <p:grpSpPr>
+        <a:xfrm>
+          <a:off x="0" y="0"/>
+          <a:ext cx="0" cy="0"/>
+          <a:chOff x="0" y="0"/>
+          <a:chExt cx="0" cy="0"/>
+        </a:xfrm>
+      </p:grpSpPr>
+      <p:sp>
+        <p:nvSpPr>
+          <p:cNvPr id="3" name="TextBox 2"/>
+          <p:cNvSpPr txBox="1"/>
+          <p:nvPr/>
+        </p:nvSpPr>
+        <p:spPr>
+          <a:xfrm>
+            <a:off x="856128" y="972843"/>
+            <a:ext cx="3258671" cy="369332"/>
+          </a:xfrm>
+          <a:prstGeom prst="rect">
+            <a:avLst/>
+          </a:prstGeom>
+          <a:noFill/>
+        </p:spPr>
+        <p:txBody>
+          <a:bodyPr wrap="square" rtlCol="0">
+            <a:spAutoFit/>
+          </a:bodyPr>
+          <a:lstStyle/>
+          <a:p>
+            <a:r>
+              <a:rPr lang="en-US" smtClean="0"/>
+              <a:t>IQConsoleManager.exe</a:t>
+            </a:r>
+            <a:endParaRPr lang="en-US"/>
+          </a:p>
+        </p:txBody>
+      </p:sp>
+      <p:sp>
+        <p:nvSpPr>
+          <p:cNvPr id="4" name="TextBox 3"/>
+          <p:cNvSpPr txBox="1"/>
+          <p:nvPr/>
+        </p:nvSpPr>
+        <p:spPr>
+          <a:xfrm>
+            <a:off x="883024" y="2895600"/>
+            <a:ext cx="7773090" cy="2200602"/>
+          </a:xfrm>
+          <a:prstGeom prst="rect">
+            <a:avLst/>
+          </a:prstGeom>
+          <a:noFill/>
+        </p:spPr>
+        <p:txBody>
+          <a:bodyPr wrap="square" rtlCol="0">
+            <a:spAutoFit/>
+          </a:bodyPr>
+          <a:lstStyle/>
+          <a:p>
+            <a:r>
+              <a:rPr lang="en-US" b="1" u="sng"/>
+              <a:t>How to </a:t>
+            </a:r>
+            <a:r>
+              <a:rPr lang="en-US" b="1" u="sng"/>
+              <a:t>use </a:t>
+            </a:r>
+            <a:r>
+              <a:rPr lang="en-US" b="1" u="sng" smtClean="0"/>
+              <a:t>IQConsoleManager.exe:</a:t>
+            </a:r>
+          </a:p>
+          <a:p>
+            <a:r>
+              <a:rPr lang="en-US" smtClean="0"/>
+              <a:t>IQConsoleManager.exe minimally requires two command line arguments:</a:t>
+            </a:r>
+          </a:p>
+          <a:p>
+            <a:pPr marL="285750" indent="-285750">
+              <a:buFont typeface="Arial" pitchFamily="34" charset="0"/>
+              <a:buChar char="•"/>
+            </a:pPr>
+            <a:r>
+              <a:rPr lang="en-US"/>
+              <a:t>Arg1 </a:t>
+            </a:r>
+            <a:r>
+              <a:rPr lang="en-US"/>
+              <a:t>= </a:t>
+            </a:r>
+            <a:r>
+              <a:rPr lang="en-US" smtClean="0"/>
+              <a:t>textfile containing list of dataset </a:t>
+            </a:r>
+            <a:r>
+              <a:rPr lang="en-US"/>
+              <a:t>file </a:t>
+            </a:r>
+            <a:r>
+              <a:rPr lang="en-US" smtClean="0"/>
+              <a:t>paths  </a:t>
+            </a:r>
+            <a:r>
+              <a:rPr lang="en-US" sz="1100"/>
+              <a:t>(</a:t>
+            </a:r>
+            <a:r>
+              <a:rPr lang="en-US" sz="1100"/>
+              <a:t>e.g </a:t>
+            </a:r>
+            <a:r>
+              <a:rPr lang="en-US" sz="1100"/>
+              <a:t>"D:\Data\Orbitrap\datasetList.txt")</a:t>
+            </a:r>
+          </a:p>
+          <a:p>
+            <a:pPr marL="285750" indent="-285750">
+              <a:buFont typeface="Arial" pitchFamily="34" charset="0"/>
+              <a:buChar char="•"/>
+            </a:pPr>
+            <a:r>
+              <a:rPr lang="en-US"/>
+              <a:t>Arg 2 </a:t>
+            </a:r>
+            <a:r>
+              <a:rPr lang="en-US"/>
+              <a:t>= </a:t>
+            </a:r>
+            <a:r>
+              <a:rPr lang="en-US"/>
+              <a:t>file path for </a:t>
+            </a:r>
+            <a:r>
+              <a:rPr lang="en-US"/>
+              <a:t>IQ </a:t>
+            </a:r>
+            <a:r>
+              <a:rPr lang="en-US" smtClean="0"/>
+              <a:t>executor parameters </a:t>
+            </a:r>
+            <a:r>
+              <a:rPr lang="en-US" sz="1100"/>
+              <a:t>(e.g</a:t>
+            </a:r>
+            <a:r>
+              <a:rPr lang="en-US" sz="1100"/>
+              <a:t>. </a:t>
+            </a:r>
+            <a:r>
+              <a:rPr lang="en-US" sz="1100"/>
+              <a:t>"D:\Data\Orbitrap\IQExecutorParameters.xml")</a:t>
+            </a:r>
+          </a:p>
+          <a:p>
+            <a:pPr marL="742950" lvl="1" indent="-285750">
+              <a:buFont typeface="Arial" pitchFamily="34" charset="0"/>
+              <a:buChar char="•"/>
+            </a:pPr>
+            <a:r>
+              <a:rPr lang="en-US" sz="1100" smtClean="0"/>
+              <a:t>See below for IQ executor parameters information</a:t>
+            </a:r>
+            <a:endParaRPr lang="en-US"/>
+          </a:p>
+          <a:p>
+            <a:endParaRPr lang="en-US" smtClean="0"/>
+          </a:p>
+          <a:p>
+            <a:r>
+              <a:rPr lang="en-US" smtClean="0"/>
+              <a:t>Sample command line (assumes that you are in the same folder as the </a:t>
+            </a:r>
+            <a:r>
+              <a:rPr lang="en-US"/>
+              <a:t>IQConsoleManager.exe </a:t>
+            </a:r>
+            <a:r>
+              <a:rPr lang="en-US" smtClean="0"/>
+              <a:t>program):</a:t>
+            </a:r>
+            <a:endParaRPr lang="en-US"/>
+          </a:p>
+        </p:txBody>
+      </p:sp>
+      <p:sp>
+        <p:nvSpPr>
+          <p:cNvPr id="7" name="TextBox 6"/>
+          <p:cNvSpPr txBox="1"/>
+          <p:nvPr/>
+        </p:nvSpPr>
+        <p:spPr>
+          <a:xfrm>
+            <a:off x="883023" y="5802868"/>
+            <a:ext cx="7773090" cy="369332"/>
+          </a:xfrm>
+          <a:prstGeom prst="rect">
+            <a:avLst/>
+          </a:prstGeom>
+          <a:noFill/>
+        </p:spPr>
+        <p:txBody>
+          <a:bodyPr wrap="square" rtlCol="0">
+            <a:spAutoFit/>
+          </a:bodyPr>
+          <a:lstStyle/>
+          <a:p>
+            <a:r>
+              <a:rPr lang="en-US" smtClean="0"/>
+              <a:t>** note the space characters between each argument.</a:t>
+            </a:r>
+            <a:endParaRPr lang="en-US"/>
+          </a:p>
+        </p:txBody>
+      </p:sp>
+      <p:sp>
+        <p:nvSpPr>
+          <p:cNvPr id="8" name="Rectangle 7"/>
+          <p:cNvSpPr/>
+          <p:nvPr/>
+        </p:nvSpPr>
+        <p:spPr>
+          <a:xfrm>
+            <a:off x="1017495" y="5177135"/>
+            <a:ext cx="7543800" cy="461665"/>
+          </a:xfrm>
+          <a:prstGeom prst="rect">
+            <a:avLst/>
+          </a:prstGeom>
+          <a:solidFill>
+            <a:schemeClr val="tx1"/>
+          </a:solidFill>
+        </p:spPr>
+        <p:txBody>
+          <a:bodyPr wrap="square">
+            <a:spAutoFit/>
+          </a:bodyPr>
+          <a:lstStyle/>
+          <a:p>
+            <a:r>
+              <a:rPr lang="en-US" sz="1200">
+                <a:solidFill>
+                  <a:schemeClr val="bg1"/>
+                </a:solidFill>
+                <a:latin typeface="Courier New" pitchFamily="49" charset="0"/>
+                <a:cs typeface="Courier New" pitchFamily="49" charset="0"/>
+              </a:rPr>
+              <a:t>IQConsoleManager "D</a:t>
+            </a:r>
+            <a:r>
+              <a:rPr lang="en-US" sz="1200">
+                <a:solidFill>
+                  <a:schemeClr val="bg1"/>
+                </a:solidFill>
+                <a:latin typeface="Courier New" pitchFamily="49" charset="0"/>
+                <a:cs typeface="Courier New" pitchFamily="49" charset="0"/>
+              </a:rPr>
+              <a:t>:\</a:t>
+            </a:r>
+            <a:r>
+              <a:rPr lang="en-US" sz="1200" smtClean="0">
+                <a:solidFill>
+                  <a:schemeClr val="bg1"/>
+                </a:solidFill>
+                <a:latin typeface="Courier New" pitchFamily="49" charset="0"/>
+                <a:cs typeface="Courier New" pitchFamily="49" charset="0"/>
+              </a:rPr>
+              <a:t>Data\Orbitrap\datasetList.txt“ "</a:t>
+            </a:r>
+            <a:r>
+              <a:rPr lang="en-US" sz="1200">
+                <a:solidFill>
+                  <a:schemeClr val="bg1"/>
+                </a:solidFill>
+                <a:latin typeface="Courier New" pitchFamily="49" charset="0"/>
+                <a:cs typeface="Courier New" pitchFamily="49" charset="0"/>
+              </a:rPr>
+              <a:t>D:\Data\Orbitrap\IQExecutorParameters.xml" </a:t>
+            </a:r>
+            <a:endParaRPr lang="en-US" sz="1200">
+              <a:solidFill>
+                <a:schemeClr val="bg1"/>
+              </a:solidFill>
+              <a:latin typeface="Courier New" pitchFamily="49" charset="0"/>
+              <a:cs typeface="Courier New" pitchFamily="49" charset="0"/>
+            </a:endParaRPr>
+          </a:p>
+        </p:txBody>
+      </p:sp>
+      <p:sp>
+        <p:nvSpPr>
+          <p:cNvPr id="11" name="TextBox 10"/>
+          <p:cNvSpPr txBox="1"/>
+          <p:nvPr/>
+        </p:nvSpPr>
+        <p:spPr>
+          <a:xfrm>
+            <a:off x="883024" y="1342175"/>
+            <a:ext cx="7773090" cy="1477328"/>
+          </a:xfrm>
+          <a:prstGeom prst="rect">
+            <a:avLst/>
+          </a:prstGeom>
+          <a:noFill/>
+        </p:spPr>
+        <p:txBody>
+          <a:bodyPr wrap="square" rtlCol="0">
+            <a:spAutoFit/>
+          </a:bodyPr>
+          <a:lstStyle/>
+          <a:p>
+            <a:r>
+              <a:rPr lang="en-US" b="1" u="sng" smtClean="0"/>
+              <a:t>Description:</a:t>
+            </a:r>
+          </a:p>
+          <a:p>
+            <a:r>
+              <a:rPr lang="en-US" smtClean="0"/>
+              <a:t>The only difference between IQConsoleManager and IQConsole is that IQConsoleManager processes a batch of raw data files and IQConsole processes them one at a time.  This is silly and these should be merged together! But this is the way it is for now.</a:t>
+            </a:r>
+          </a:p>
+        </p:txBody>
+      </p:sp>
+    </p:spTree>
+    <p:extLst>
+      <p:ext uri="{BB962C8B-B14F-4D97-AF65-F5344CB8AC3E}">
+        <p14:creationId xmlns:p14="http://schemas.microsoft.com/office/powerpoint/2010/main" val="1331050220"/>
+      </p:ext>
+    </p:extLst>
+  </p:cSld>
+  <p:clrMapOvr>
+    <a:masterClrMapping/>
+  </p:clrMapOvr>
+</p:sld>
+</file>
+
+<file path=ppt/slides/slide6.xml><?xml version="1.0" encoding="utf-8"?>
+<p:sld xmlns:a="http://schemas.openxmlformats.org/drawingml/2006/main" xmlns:r="http://schemas.openxmlformats.org/officeDocument/2006/relationships" xmlns:p="http://schemas.openxmlformats.org/presentationml/2006/main">
+  <p:cSld>
+    <p:spTree>
+      <p:nvGrpSpPr>
+        <p:cNvPr id="1" name=""/>
+        <p:cNvGrpSpPr/>
+        <p:nvPr/>
+      </p:nvGrpSpPr>
+      <p:grpSpPr>
+        <a:xfrm>
+          <a:off x="0" y="0"/>
+          <a:ext cx="0" cy="0"/>
+          <a:chOff x="0" y="0"/>
+          <a:chExt cx="0" cy="0"/>
+        </a:xfrm>
+      </p:grpSpPr>
+      <p:sp>
+        <p:nvSpPr>
+          <p:cNvPr id="2" name="TextBox 1"/>
+          <p:cNvSpPr txBox="1"/>
+          <p:nvPr/>
+        </p:nvSpPr>
+        <p:spPr>
+          <a:xfrm>
+            <a:off x="762000" y="609600"/>
+            <a:ext cx="2743200" cy="369332"/>
+          </a:xfrm>
+          <a:prstGeom prst="rect">
+            <a:avLst/>
+          </a:prstGeom>
+          <a:noFill/>
+        </p:spPr>
+        <p:txBody>
+          <a:bodyPr wrap="square" rtlCol="0">
+            <a:spAutoFit/>
+          </a:bodyPr>
+          <a:lstStyle/>
+          <a:p>
+            <a:r>
+              <a:rPr lang="en-US" b="1" u="sng" smtClean="0"/>
+              <a:t>IQ parameter files</a:t>
+            </a:r>
+            <a:endParaRPr lang="en-US" b="1" u="sng"/>
+          </a:p>
+        </p:txBody>
+      </p:sp>
+      <p:sp>
+        <p:nvSpPr>
+          <p:cNvPr id="3" name="TextBox 2"/>
+          <p:cNvSpPr txBox="1"/>
+          <p:nvPr/>
+        </p:nvSpPr>
+        <p:spPr>
+          <a:xfrm>
+            <a:off x="762000" y="1193661"/>
+            <a:ext cx="7726218" cy="4493538"/>
+          </a:xfrm>
+          <a:prstGeom prst="rect">
+            <a:avLst/>
+          </a:prstGeom>
+          <a:noFill/>
+        </p:spPr>
+        <p:txBody>
+          <a:bodyPr wrap="square" rtlCol="0">
+            <a:spAutoFit/>
+          </a:bodyPr>
+          <a:lstStyle/>
+          <a:p>
+            <a:r>
+              <a:rPr lang="en-US" smtClean="0"/>
+              <a:t>Description:</a:t>
+            </a:r>
+          </a:p>
+          <a:p>
+            <a:r>
+              <a:rPr lang="en-US" smtClean="0"/>
+              <a:t>There are two parameter files for IQ processing:</a:t>
+            </a:r>
+          </a:p>
+          <a:p>
+            <a:pPr marL="342900" indent="-342900">
+              <a:buAutoNum type="arabicParenR"/>
+            </a:pPr>
+            <a:r>
+              <a:rPr lang="en-US" smtClean="0"/>
+              <a:t>IQ executor parameter file</a:t>
+            </a:r>
+          </a:p>
+          <a:p>
+            <a:pPr marL="800100" lvl="1" indent="-342900">
+              <a:buFont typeface="Arial" pitchFamily="34" charset="0"/>
+              <a:buChar char="•"/>
+            </a:pPr>
+            <a:r>
+              <a:rPr lang="en-US" smtClean="0"/>
+              <a:t>Paths to files needed for IQ processing.</a:t>
+            </a:r>
+          </a:p>
+          <a:p>
+            <a:pPr marL="1257300" lvl="2" indent="-342900">
+              <a:buFont typeface="Arial" pitchFamily="34" charset="0"/>
+              <a:buChar char="•"/>
+            </a:pPr>
+            <a:r>
+              <a:rPr lang="en-US" smtClean="0"/>
+              <a:t>path to the .txt file that contains the Targets</a:t>
+            </a:r>
+          </a:p>
+          <a:p>
+            <a:pPr marL="1257300" lvl="2" indent="-342900">
+              <a:buFont typeface="Arial" pitchFamily="34" charset="0"/>
+              <a:buChar char="•"/>
+            </a:pPr>
+            <a:r>
+              <a:rPr lang="en-US" smtClean="0"/>
+              <a:t>path to the .xml file that contains algorithm-related parameters for IQ processing (see below)</a:t>
+            </a:r>
+          </a:p>
+          <a:p>
+            <a:pPr marL="1257300" lvl="2" indent="-342900">
+              <a:buFont typeface="Arial" pitchFamily="34" charset="0"/>
+              <a:buChar char="•"/>
+            </a:pPr>
+            <a:r>
+              <a:rPr lang="en-US" sz="1400" smtClean="0"/>
+              <a:t>[Optional] path to the targets .txt file used in LC alignment</a:t>
+            </a:r>
+          </a:p>
+          <a:p>
+            <a:pPr marL="1257300" lvl="2" indent="-342900">
+              <a:buFont typeface="Arial" pitchFamily="34" charset="0"/>
+              <a:buChar char="•"/>
+            </a:pPr>
+            <a:r>
+              <a:rPr lang="en-US" sz="1400" smtClean="0"/>
+              <a:t>[Optional] path to the parameter file that defines LC alignment parameters</a:t>
+            </a:r>
+          </a:p>
+          <a:p>
+            <a:pPr marL="1257300" lvl="2" indent="-342900">
+              <a:buFont typeface="Arial" pitchFamily="34" charset="0"/>
+              <a:buChar char="•"/>
+            </a:pPr>
+            <a:r>
+              <a:rPr lang="en-US" sz="1400" smtClean="0"/>
+              <a:t>[Optional] results folder path	</a:t>
+            </a:r>
+          </a:p>
+          <a:p>
+            <a:pPr marL="1257300" lvl="2" indent="-342900">
+              <a:buFont typeface="Arial" pitchFamily="34" charset="0"/>
+              <a:buChar char="•"/>
+            </a:pPr>
+            <a:r>
+              <a:rPr lang="en-US" sz="1400" smtClean="0"/>
+              <a:t>[Optional] logging folder path</a:t>
+            </a:r>
+          </a:p>
+          <a:p>
+            <a:pPr marL="342900" indent="-342900">
+              <a:buFont typeface="Arial" pitchFamily="34" charset="0"/>
+              <a:buChar char="•"/>
+            </a:pPr>
+            <a:endParaRPr lang="en-US" sz="1400" smtClean="0"/>
+          </a:p>
+          <a:p>
+            <a:pPr marL="342900" indent="-342900">
+              <a:buFont typeface="+mj-lt"/>
+              <a:buAutoNum type="arabicPeriod" startAt="2"/>
+            </a:pPr>
+            <a:r>
+              <a:rPr lang="en-US" smtClean="0"/>
+              <a:t>IQ algorithm parameter file</a:t>
+            </a:r>
+          </a:p>
+          <a:p>
+            <a:pPr marL="800100" lvl="1" indent="-342900">
+              <a:buFont typeface="Arial" pitchFamily="34" charset="0"/>
+              <a:buChar char="•"/>
+            </a:pPr>
+            <a:r>
+              <a:rPr lang="en-US" smtClean="0"/>
+              <a:t>Contains values / tolerances related to IQ data processing. [TODO: add slide on what these are]</a:t>
+            </a:r>
+          </a:p>
+          <a:p>
+            <a:pPr marL="800100" lvl="1" indent="-342900">
+              <a:buFont typeface="Arial" pitchFamily="34" charset="0"/>
+              <a:buChar char="•"/>
+            </a:pPr>
+            <a:r>
+              <a:rPr lang="en-US" smtClean="0"/>
+              <a:t>NOTE: the path to this file is defined within the IQ executor parameter file</a:t>
+            </a:r>
+            <a:endParaRPr lang="en-US"/>
+          </a:p>
+        </p:txBody>
+      </p:sp>
+    </p:spTree>
+    <p:extLst>
+      <p:ext uri="{BB962C8B-B14F-4D97-AF65-F5344CB8AC3E}">
+        <p14:creationId xmlns:p14="http://schemas.microsoft.com/office/powerpoint/2010/main" val="3716404217"/>
       </p:ext>
     </p:extLst>
   </p:cSld>

</xml_diff>